<commit_message>
- Added roadmap to intro slides.
</commit_message>
<xml_diff>
--- a/slides/Intro.pptx
+++ b/slides/Intro.pptx
@@ -23,23 +23,23 @@
   <p:notesSz cx="6858000" cy="9144000"/>
   <p:embeddedFontLst>
     <p:embeddedFont>
-      <p:font typeface="Calibri" pitchFamily="34" charset="0"/>
+      <p:font typeface="Titillium Web" pitchFamily="2" charset="0"/>
       <p:regular r:id="rId13"/>
       <p:bold r:id="rId14"/>
       <p:italic r:id="rId15"/>
       <p:boldItalic r:id="rId16"/>
     </p:embeddedFont>
     <p:embeddedFont>
-      <p:font typeface="Calibri Light" pitchFamily="34" charset="0"/>
+      <p:font typeface="Calibri" pitchFamily="34" charset="0"/>
       <p:regular r:id="rId17"/>
-      <p:italic r:id="rId18"/>
+      <p:bold r:id="rId18"/>
+      <p:italic r:id="rId19"/>
+      <p:boldItalic r:id="rId20"/>
     </p:embeddedFont>
     <p:embeddedFont>
-      <p:font typeface="Titillium Web" pitchFamily="2" charset="0"/>
-      <p:regular r:id="rId19"/>
-      <p:bold r:id="rId20"/>
-      <p:italic r:id="rId21"/>
-      <p:boldItalic r:id="rId22"/>
+      <p:font typeface="Calibri Light" pitchFamily="34" charset="0"/>
+      <p:regular r:id="rId21"/>
+      <p:italic r:id="rId22"/>
     </p:embeddedFont>
   </p:embeddedFontLst>
   <p:defaultTextStyle>
@@ -273,7 +273,7 @@
   </p:defaultTextStyle>
   <p:extLst>
     <p:ext uri="{EFAFB233-063F-42B5-8137-9DF3F51BA10A}">
-      <p15:sldGuideLst xmlns:p15="http://schemas.microsoft.com/office/powerpoint/2012/main" xmlns=""/>
+      <p15:sldGuideLst xmlns="" xmlns:p15="http://schemas.microsoft.com/office/powerpoint/2012/main"/>
     </p:ext>
   </p:extLst>
 </p:presentation>
@@ -854,7 +854,7 @@
           <a:p>
             <a:fld id="{A19DA7EA-ED0D-434A-B92C-64FEB37E1DC9}" type="datetimeFigureOut">
               <a:rPr lang="sl-SI" smtClean="0"/>
-              <a:t>22. 07. 2019</a:t>
+              <a:t>23. 07. 2019</a:t>
             </a:fld>
             <a:endParaRPr lang="sl-SI"/>
           </a:p>
@@ -1024,7 +1024,7 @@
           <a:p>
             <a:fld id="{A19DA7EA-ED0D-434A-B92C-64FEB37E1DC9}" type="datetimeFigureOut">
               <a:rPr lang="sl-SI" smtClean="0"/>
-              <a:t>22. 07. 2019</a:t>
+              <a:t>23. 07. 2019</a:t>
             </a:fld>
             <a:endParaRPr lang="sl-SI"/>
           </a:p>
@@ -1204,7 +1204,7 @@
           <a:p>
             <a:fld id="{A19DA7EA-ED0D-434A-B92C-64FEB37E1DC9}" type="datetimeFigureOut">
               <a:rPr lang="sl-SI" smtClean="0"/>
-              <a:t>22. 07. 2019</a:t>
+              <a:t>23. 07. 2019</a:t>
             </a:fld>
             <a:endParaRPr lang="sl-SI"/>
           </a:p>
@@ -1374,7 +1374,7 @@
           <a:p>
             <a:fld id="{A19DA7EA-ED0D-434A-B92C-64FEB37E1DC9}" type="datetimeFigureOut">
               <a:rPr lang="sl-SI" smtClean="0"/>
-              <a:t>22. 07. 2019</a:t>
+              <a:t>23. 07. 2019</a:t>
             </a:fld>
             <a:endParaRPr lang="sl-SI"/>
           </a:p>
@@ -1620,7 +1620,7 @@
           <a:p>
             <a:fld id="{A19DA7EA-ED0D-434A-B92C-64FEB37E1DC9}" type="datetimeFigureOut">
               <a:rPr lang="sl-SI" smtClean="0"/>
-              <a:t>22. 07. 2019</a:t>
+              <a:t>23. 07. 2019</a:t>
             </a:fld>
             <a:endParaRPr lang="sl-SI"/>
           </a:p>
@@ -1852,7 +1852,7 @@
           <a:p>
             <a:fld id="{A19DA7EA-ED0D-434A-B92C-64FEB37E1DC9}" type="datetimeFigureOut">
               <a:rPr lang="sl-SI" smtClean="0"/>
-              <a:t>22. 07. 2019</a:t>
+              <a:t>23. 07. 2019</a:t>
             </a:fld>
             <a:endParaRPr lang="sl-SI"/>
           </a:p>
@@ -2219,7 +2219,7 @@
           <a:p>
             <a:fld id="{A19DA7EA-ED0D-434A-B92C-64FEB37E1DC9}" type="datetimeFigureOut">
               <a:rPr lang="sl-SI" smtClean="0"/>
-              <a:t>22. 07. 2019</a:t>
+              <a:t>23. 07. 2019</a:t>
             </a:fld>
             <a:endParaRPr lang="sl-SI"/>
           </a:p>
@@ -2337,7 +2337,7 @@
           <a:p>
             <a:fld id="{A19DA7EA-ED0D-434A-B92C-64FEB37E1DC9}" type="datetimeFigureOut">
               <a:rPr lang="sl-SI" smtClean="0"/>
-              <a:t>22. 07. 2019</a:t>
+              <a:t>23. 07. 2019</a:t>
             </a:fld>
             <a:endParaRPr lang="sl-SI"/>
           </a:p>
@@ -2432,7 +2432,7 @@
           <a:p>
             <a:fld id="{A19DA7EA-ED0D-434A-B92C-64FEB37E1DC9}" type="datetimeFigureOut">
               <a:rPr lang="sl-SI" smtClean="0"/>
-              <a:t>22. 07. 2019</a:t>
+              <a:t>23. 07. 2019</a:t>
             </a:fld>
             <a:endParaRPr lang="sl-SI"/>
           </a:p>
@@ -2709,7 +2709,7 @@
           <a:p>
             <a:fld id="{A19DA7EA-ED0D-434A-B92C-64FEB37E1DC9}" type="datetimeFigureOut">
               <a:rPr lang="sl-SI" smtClean="0"/>
-              <a:t>22. 07. 2019</a:t>
+              <a:t>23. 07. 2019</a:t>
             </a:fld>
             <a:endParaRPr lang="sl-SI"/>
           </a:p>
@@ -2962,7 +2962,7 @@
           <a:p>
             <a:fld id="{A19DA7EA-ED0D-434A-B92C-64FEB37E1DC9}" type="datetimeFigureOut">
               <a:rPr lang="sl-SI" smtClean="0"/>
-              <a:t>22. 07. 2019</a:t>
+              <a:t>23. 07. 2019</a:t>
             </a:fld>
             <a:endParaRPr lang="sl-SI"/>
           </a:p>
@@ -3175,7 +3175,7 @@
           <a:p>
             <a:fld id="{A19DA7EA-ED0D-434A-B92C-64FEB37E1DC9}" type="datetimeFigureOut">
               <a:rPr lang="sl-SI" smtClean="0"/>
-              <a:t>22. 07. 2019</a:t>
+              <a:t>23. 07. 2019</a:t>
             </a:fld>
             <a:endParaRPr lang="sl-SI"/>
           </a:p>
@@ -3780,6 +3780,696 @@
           </a:extLst>
         </p:spPr>
       </p:pic>
+      <p:sp>
+        <p:nvSpPr>
+          <p:cNvPr id="6" name="Freeform 5"/>
+          <p:cNvSpPr/>
+          <p:nvPr/>
+        </p:nvSpPr>
+        <p:spPr>
+          <a:xfrm>
+            <a:off x="656348" y="3945954"/>
+            <a:ext cx="5503230" cy="630115"/>
+          </a:xfrm>
+          <a:custGeom>
+            <a:avLst/>
+            <a:gdLst>
+              <a:gd name="connsiteX0" fmla="*/ 0 w 5503230"/>
+              <a:gd name="connsiteY0" fmla="*/ 573882 h 630115"/>
+              <a:gd name="connsiteX1" fmla="*/ 1610018 w 5503230"/>
+              <a:gd name="connsiteY1" fmla="*/ 1681 h 630115"/>
+              <a:gd name="connsiteX2" fmla="*/ 3416378 w 5503230"/>
+              <a:gd name="connsiteY2" fmla="*/ 388759 h 630115"/>
+              <a:gd name="connsiteX3" fmla="*/ 4241021 w 5503230"/>
+              <a:gd name="connsiteY3" fmla="*/ 85828 h 630115"/>
+              <a:gd name="connsiteX4" fmla="*/ 4263461 w 5503230"/>
+              <a:gd name="connsiteY4" fmla="*/ 585102 h 630115"/>
+              <a:gd name="connsiteX5" fmla="*/ 5503230 w 5503230"/>
+              <a:gd name="connsiteY5" fmla="*/ 596322 h 630115"/>
+            </a:gdLst>
+            <a:ahLst/>
+            <a:cxnLst>
+              <a:cxn ang="0">
+                <a:pos x="connsiteX0" y="connsiteY0"/>
+              </a:cxn>
+              <a:cxn ang="0">
+                <a:pos x="connsiteX1" y="connsiteY1"/>
+              </a:cxn>
+              <a:cxn ang="0">
+                <a:pos x="connsiteX2" y="connsiteY2"/>
+              </a:cxn>
+              <a:cxn ang="0">
+                <a:pos x="connsiteX3" y="connsiteY3"/>
+              </a:cxn>
+              <a:cxn ang="0">
+                <a:pos x="connsiteX4" y="connsiteY4"/>
+              </a:cxn>
+              <a:cxn ang="0">
+                <a:pos x="connsiteX5" y="connsiteY5"/>
+              </a:cxn>
+            </a:cxnLst>
+            <a:rect l="l" t="t" r="r" b="b"/>
+            <a:pathLst>
+              <a:path w="5503230" h="630115">
+                <a:moveTo>
+                  <a:pt x="0" y="573882"/>
+                </a:moveTo>
+                <a:cubicBezTo>
+                  <a:pt x="520311" y="303208"/>
+                  <a:pt x="1040622" y="32535"/>
+                  <a:pt x="1610018" y="1681"/>
+                </a:cubicBezTo>
+                <a:cubicBezTo>
+                  <a:pt x="2179414" y="-29173"/>
+                  <a:pt x="2977878" y="374734"/>
+                  <a:pt x="3416378" y="388759"/>
+                </a:cubicBezTo>
+                <a:cubicBezTo>
+                  <a:pt x="3854879" y="402783"/>
+                  <a:pt x="4099841" y="53104"/>
+                  <a:pt x="4241021" y="85828"/>
+                </a:cubicBezTo>
+                <a:cubicBezTo>
+                  <a:pt x="4382201" y="118552"/>
+                  <a:pt x="4053093" y="500020"/>
+                  <a:pt x="4263461" y="585102"/>
+                </a:cubicBezTo>
+                <a:cubicBezTo>
+                  <a:pt x="4473829" y="670184"/>
+                  <a:pt x="5255463" y="611281"/>
+                  <a:pt x="5503230" y="596322"/>
+                </a:cubicBezTo>
+              </a:path>
+            </a:pathLst>
+          </a:custGeom>
+          <a:ln w="19050">
+            <a:solidFill>
+              <a:schemeClr val="bg2">
+                <a:lumMod val="50000"/>
+              </a:schemeClr>
+            </a:solidFill>
+          </a:ln>
+        </p:spPr>
+        <p:style>
+          <a:lnRef idx="1">
+            <a:schemeClr val="accent1"/>
+          </a:lnRef>
+          <a:fillRef idx="0">
+            <a:schemeClr val="accent1"/>
+          </a:fillRef>
+          <a:effectRef idx="0">
+            <a:schemeClr val="accent1"/>
+          </a:effectRef>
+          <a:fontRef idx="minor">
+            <a:schemeClr val="tx1"/>
+          </a:fontRef>
+        </p:style>
+        <p:txBody>
+          <a:bodyPr rtlCol="0" anchor="ctr"/>
+          <a:lstStyle/>
+          <a:p>
+            <a:pPr algn="ctr"/>
+            <a:endParaRPr lang="en-US" sz="1050">
+              <a:latin typeface="Titillium Web" pitchFamily="2" charset="0"/>
+            </a:endParaRPr>
+          </a:p>
+        </p:txBody>
+      </p:sp>
+      <p:sp>
+        <p:nvSpPr>
+          <p:cNvPr id="7" name="Rectangle 6"/>
+          <p:cNvSpPr/>
+          <p:nvPr/>
+        </p:nvSpPr>
+        <p:spPr>
+          <a:xfrm>
+            <a:off x="5906912" y="4568788"/>
+            <a:ext cx="779381" cy="253916"/>
+          </a:xfrm>
+          <a:prstGeom prst="rect">
+            <a:avLst/>
+          </a:prstGeom>
+        </p:spPr>
+        <p:txBody>
+          <a:bodyPr wrap="none">
+            <a:spAutoFit/>
+          </a:bodyPr>
+          <a:lstStyle/>
+          <a:p>
+            <a:r>
+              <a:rPr lang="en-US" sz="1050" dirty="0">
+                <a:latin typeface="Titillium Web" pitchFamily="2" charset="0"/>
+              </a:rPr>
+              <a:t>Hands-on.</a:t>
+            </a:r>
+            <a:endParaRPr lang="en-US" sz="1050" dirty="0">
+              <a:latin typeface="Titillium Web" pitchFamily="2" charset="0"/>
+            </a:endParaRPr>
+          </a:p>
+        </p:txBody>
+      </p:sp>
+      <p:sp>
+        <p:nvSpPr>
+          <p:cNvPr id="8" name="Rectangle 7"/>
+          <p:cNvSpPr/>
+          <p:nvPr/>
+        </p:nvSpPr>
+        <p:spPr>
+          <a:xfrm>
+            <a:off x="295506" y="4580039"/>
+            <a:ext cx="614271" cy="253916"/>
+          </a:xfrm>
+          <a:prstGeom prst="rect">
+            <a:avLst/>
+          </a:prstGeom>
+        </p:spPr>
+        <p:txBody>
+          <a:bodyPr wrap="none">
+            <a:spAutoFit/>
+          </a:bodyPr>
+          <a:lstStyle/>
+          <a:p>
+            <a:r>
+              <a:rPr lang="en-US" sz="1050" dirty="0">
+                <a:latin typeface="Titillium Web" pitchFamily="2" charset="0"/>
+              </a:rPr>
+              <a:t>Why R?</a:t>
+            </a:r>
+          </a:p>
+        </p:txBody>
+      </p:sp>
+      <p:sp>
+        <p:nvSpPr>
+          <p:cNvPr id="9" name="Rectangle 8"/>
+          <p:cNvSpPr/>
+          <p:nvPr/>
+        </p:nvSpPr>
+        <p:spPr>
+          <a:xfrm>
+            <a:off x="295506" y="3891673"/>
+            <a:ext cx="1141882" cy="253916"/>
+          </a:xfrm>
+          <a:prstGeom prst="rect">
+            <a:avLst/>
+          </a:prstGeom>
+        </p:spPr>
+        <p:txBody>
+          <a:bodyPr wrap="square">
+            <a:spAutoFit/>
+          </a:bodyPr>
+          <a:lstStyle/>
+          <a:p>
+            <a:r>
+              <a:rPr lang="en-US" sz="1050" dirty="0" smtClean="0">
+                <a:latin typeface="Titillium Web" pitchFamily="2" charset="0"/>
+              </a:rPr>
+              <a:t>Getting started.</a:t>
+            </a:r>
+            <a:endParaRPr lang="en-US" sz="1050" dirty="0">
+              <a:latin typeface="Titillium Web" pitchFamily="2" charset="0"/>
+            </a:endParaRPr>
+          </a:p>
+        </p:txBody>
+      </p:sp>
+      <p:sp>
+        <p:nvSpPr>
+          <p:cNvPr id="10" name="Rectangle 9"/>
+          <p:cNvSpPr/>
+          <p:nvPr/>
+        </p:nvSpPr>
+        <p:spPr>
+          <a:xfrm>
+            <a:off x="2722927" y="4288548"/>
+            <a:ext cx="899605" cy="415498"/>
+          </a:xfrm>
+          <a:prstGeom prst="rect">
+            <a:avLst/>
+          </a:prstGeom>
+        </p:spPr>
+        <p:txBody>
+          <a:bodyPr wrap="none">
+            <a:spAutoFit/>
+          </a:bodyPr>
+          <a:lstStyle/>
+          <a:p>
+            <a:r>
+              <a:rPr lang="en-US" sz="1050" dirty="0" smtClean="0">
+                <a:latin typeface="Titillium Web" pitchFamily="2" charset="0"/>
+              </a:rPr>
+              <a:t>Visualization</a:t>
+            </a:r>
+          </a:p>
+          <a:p>
+            <a:r>
+              <a:rPr lang="en-US" sz="1050" dirty="0" smtClean="0">
+                <a:latin typeface="Titillium Web" pitchFamily="2" charset="0"/>
+              </a:rPr>
+              <a:t>and ggplot2</a:t>
+            </a:r>
+            <a:r>
+              <a:rPr lang="en-US" sz="1050" dirty="0">
+                <a:latin typeface="Titillium Web" pitchFamily="2" charset="0"/>
+              </a:rPr>
+              <a:t>.</a:t>
+            </a:r>
+            <a:endParaRPr lang="en-US" sz="1050" dirty="0">
+              <a:latin typeface="Titillium Web" pitchFamily="2" charset="0"/>
+            </a:endParaRPr>
+          </a:p>
+        </p:txBody>
+      </p:sp>
+      <p:sp>
+        <p:nvSpPr>
+          <p:cNvPr id="11" name="Rectangle 10"/>
+          <p:cNvSpPr/>
+          <p:nvPr/>
+        </p:nvSpPr>
+        <p:spPr>
+          <a:xfrm>
+            <a:off x="4403449" y="3753180"/>
+            <a:ext cx="1281120" cy="253916"/>
+          </a:xfrm>
+          <a:prstGeom prst="rect">
+            <a:avLst/>
+          </a:prstGeom>
+        </p:spPr>
+        <p:txBody>
+          <a:bodyPr wrap="none">
+            <a:spAutoFit/>
+          </a:bodyPr>
+          <a:lstStyle/>
+          <a:p>
+            <a:r>
+              <a:rPr lang="en-US" sz="1050" dirty="0">
+                <a:latin typeface="Titillium Web" pitchFamily="2" charset="0"/>
+              </a:rPr>
+              <a:t>Basic data analysis.</a:t>
+            </a:r>
+          </a:p>
+        </p:txBody>
+      </p:sp>
+      <p:sp>
+        <p:nvSpPr>
+          <p:cNvPr id="12" name="Rectangle 11"/>
+          <p:cNvSpPr/>
+          <p:nvPr/>
+        </p:nvSpPr>
+        <p:spPr>
+          <a:xfrm>
+            <a:off x="4403449" y="4595719"/>
+            <a:ext cx="1144865" cy="253916"/>
+          </a:xfrm>
+          <a:prstGeom prst="rect">
+            <a:avLst/>
+          </a:prstGeom>
+        </p:spPr>
+        <p:txBody>
+          <a:bodyPr wrap="none">
+            <a:spAutoFit/>
+          </a:bodyPr>
+          <a:lstStyle/>
+          <a:p>
+            <a:r>
+              <a:rPr lang="en-US" sz="1050" dirty="0">
+                <a:latin typeface="Titillium Web" pitchFamily="2" charset="0"/>
+              </a:rPr>
+              <a:t>Dynamic reports.</a:t>
+            </a:r>
+            <a:endParaRPr lang="en-US" sz="1050" dirty="0">
+              <a:latin typeface="Titillium Web" pitchFamily="2" charset="0"/>
+            </a:endParaRPr>
+          </a:p>
+        </p:txBody>
+      </p:sp>
+      <p:sp>
+        <p:nvSpPr>
+          <p:cNvPr id="13" name="Oval 12"/>
+          <p:cNvSpPr/>
+          <p:nvPr/>
+        </p:nvSpPr>
+        <p:spPr>
+          <a:xfrm>
+            <a:off x="622348" y="4470234"/>
+            <a:ext cx="90666" cy="86798"/>
+          </a:xfrm>
+          <a:prstGeom prst="ellipse">
+            <a:avLst/>
+          </a:prstGeom>
+          <a:solidFill>
+            <a:srgbClr val="4D4D4D"/>
+          </a:solidFill>
+          <a:ln>
+            <a:solidFill>
+              <a:srgbClr val="4D4D4D"/>
+            </a:solidFill>
+          </a:ln>
+        </p:spPr>
+        <p:style>
+          <a:lnRef idx="2">
+            <a:schemeClr val="accent1">
+              <a:shade val="50000"/>
+            </a:schemeClr>
+          </a:lnRef>
+          <a:fillRef idx="1">
+            <a:schemeClr val="accent1"/>
+          </a:fillRef>
+          <a:effectRef idx="0">
+            <a:schemeClr val="accent1"/>
+          </a:effectRef>
+          <a:fontRef idx="minor">
+            <a:schemeClr val="lt1"/>
+          </a:fontRef>
+        </p:style>
+        <p:txBody>
+          <a:bodyPr rtlCol="0" anchor="ctr"/>
+          <a:lstStyle/>
+          <a:p>
+            <a:pPr algn="ctr"/>
+            <a:endParaRPr lang="en-US"/>
+          </a:p>
+        </p:txBody>
+      </p:sp>
+      <p:sp>
+        <p:nvSpPr>
+          <p:cNvPr id="16" name="Oval 15"/>
+          <p:cNvSpPr/>
+          <p:nvPr/>
+        </p:nvSpPr>
+        <p:spPr>
+          <a:xfrm>
+            <a:off x="1259632" y="4155926"/>
+            <a:ext cx="90666" cy="86798"/>
+          </a:xfrm>
+          <a:prstGeom prst="ellipse">
+            <a:avLst/>
+          </a:prstGeom>
+          <a:solidFill>
+            <a:srgbClr val="4D4D4D"/>
+          </a:solidFill>
+          <a:ln>
+            <a:solidFill>
+              <a:srgbClr val="4D4D4D"/>
+            </a:solidFill>
+          </a:ln>
+        </p:spPr>
+        <p:style>
+          <a:lnRef idx="2">
+            <a:schemeClr val="accent1">
+              <a:shade val="50000"/>
+            </a:schemeClr>
+          </a:lnRef>
+          <a:fillRef idx="1">
+            <a:schemeClr val="accent1"/>
+          </a:fillRef>
+          <a:effectRef idx="0">
+            <a:schemeClr val="accent1"/>
+          </a:effectRef>
+          <a:fontRef idx="minor">
+            <a:schemeClr val="lt1"/>
+          </a:fontRef>
+        </p:style>
+        <p:txBody>
+          <a:bodyPr rtlCol="0" anchor="ctr"/>
+          <a:lstStyle/>
+          <a:p>
+            <a:pPr algn="ctr"/>
+            <a:endParaRPr lang="en-US"/>
+          </a:p>
+        </p:txBody>
+      </p:sp>
+      <p:sp>
+        <p:nvSpPr>
+          <p:cNvPr id="17" name="Oval 16"/>
+          <p:cNvSpPr/>
+          <p:nvPr/>
+        </p:nvSpPr>
+        <p:spPr>
+          <a:xfrm>
+            <a:off x="4833604" y="4008166"/>
+            <a:ext cx="90666" cy="86798"/>
+          </a:xfrm>
+          <a:prstGeom prst="ellipse">
+            <a:avLst/>
+          </a:prstGeom>
+          <a:solidFill>
+            <a:srgbClr val="4D4D4D"/>
+          </a:solidFill>
+          <a:ln>
+            <a:solidFill>
+              <a:srgbClr val="4D4D4D"/>
+            </a:solidFill>
+          </a:ln>
+        </p:spPr>
+        <p:style>
+          <a:lnRef idx="2">
+            <a:schemeClr val="accent1">
+              <a:shade val="50000"/>
+            </a:schemeClr>
+          </a:lnRef>
+          <a:fillRef idx="1">
+            <a:schemeClr val="accent1"/>
+          </a:fillRef>
+          <a:effectRef idx="0">
+            <a:schemeClr val="accent1"/>
+          </a:effectRef>
+          <a:fontRef idx="minor">
+            <a:schemeClr val="lt1"/>
+          </a:fontRef>
+        </p:style>
+        <p:txBody>
+          <a:bodyPr rtlCol="0" anchor="ctr"/>
+          <a:lstStyle/>
+          <a:p>
+            <a:pPr algn="ctr"/>
+            <a:endParaRPr lang="en-US"/>
+          </a:p>
+        </p:txBody>
+      </p:sp>
+      <p:sp>
+        <p:nvSpPr>
+          <p:cNvPr id="18" name="Oval 17"/>
+          <p:cNvSpPr/>
+          <p:nvPr/>
+        </p:nvSpPr>
+        <p:spPr>
+          <a:xfrm>
+            <a:off x="3407963" y="4161035"/>
+            <a:ext cx="90666" cy="86798"/>
+          </a:xfrm>
+          <a:prstGeom prst="ellipse">
+            <a:avLst/>
+          </a:prstGeom>
+          <a:solidFill>
+            <a:srgbClr val="4D4D4D"/>
+          </a:solidFill>
+          <a:ln>
+            <a:solidFill>
+              <a:srgbClr val="4D4D4D"/>
+            </a:solidFill>
+          </a:ln>
+        </p:spPr>
+        <p:style>
+          <a:lnRef idx="2">
+            <a:schemeClr val="accent1">
+              <a:shade val="50000"/>
+            </a:schemeClr>
+          </a:lnRef>
+          <a:fillRef idx="1">
+            <a:schemeClr val="accent1"/>
+          </a:fillRef>
+          <a:effectRef idx="0">
+            <a:schemeClr val="accent1"/>
+          </a:effectRef>
+          <a:fontRef idx="minor">
+            <a:schemeClr val="lt1"/>
+          </a:fontRef>
+        </p:style>
+        <p:txBody>
+          <a:bodyPr rtlCol="0" anchor="ctr"/>
+          <a:lstStyle/>
+          <a:p>
+            <a:pPr algn="ctr"/>
+            <a:endParaRPr lang="en-US"/>
+          </a:p>
+        </p:txBody>
+      </p:sp>
+      <p:sp>
+        <p:nvSpPr>
+          <p:cNvPr id="19" name="Oval 18"/>
+          <p:cNvSpPr/>
+          <p:nvPr/>
+        </p:nvSpPr>
+        <p:spPr>
+          <a:xfrm>
+            <a:off x="4885215" y="4483102"/>
+            <a:ext cx="90666" cy="86798"/>
+          </a:xfrm>
+          <a:prstGeom prst="ellipse">
+            <a:avLst/>
+          </a:prstGeom>
+          <a:solidFill>
+            <a:srgbClr val="4D4D4D"/>
+          </a:solidFill>
+          <a:ln>
+            <a:solidFill>
+              <a:srgbClr val="4D4D4D"/>
+            </a:solidFill>
+          </a:ln>
+        </p:spPr>
+        <p:style>
+          <a:lnRef idx="2">
+            <a:schemeClr val="accent1">
+              <a:shade val="50000"/>
+            </a:schemeClr>
+          </a:lnRef>
+          <a:fillRef idx="1">
+            <a:schemeClr val="accent1"/>
+          </a:fillRef>
+          <a:effectRef idx="0">
+            <a:schemeClr val="accent1"/>
+          </a:effectRef>
+          <a:fontRef idx="minor">
+            <a:schemeClr val="lt1"/>
+          </a:fontRef>
+        </p:style>
+        <p:txBody>
+          <a:bodyPr rtlCol="0" anchor="ctr"/>
+          <a:lstStyle/>
+          <a:p>
+            <a:pPr algn="ctr"/>
+            <a:endParaRPr lang="en-US"/>
+          </a:p>
+        </p:txBody>
+      </p:sp>
+      <p:sp>
+        <p:nvSpPr>
+          <p:cNvPr id="20" name="Oval 19"/>
+          <p:cNvSpPr/>
+          <p:nvPr/>
+        </p:nvSpPr>
+        <p:spPr>
+          <a:xfrm>
+            <a:off x="6114245" y="4498782"/>
+            <a:ext cx="90666" cy="86798"/>
+          </a:xfrm>
+          <a:prstGeom prst="ellipse">
+            <a:avLst/>
+          </a:prstGeom>
+          <a:solidFill>
+            <a:srgbClr val="4D4D4D"/>
+          </a:solidFill>
+          <a:ln>
+            <a:solidFill>
+              <a:srgbClr val="4D4D4D"/>
+            </a:solidFill>
+          </a:ln>
+        </p:spPr>
+        <p:style>
+          <a:lnRef idx="2">
+            <a:schemeClr val="accent1">
+              <a:shade val="50000"/>
+            </a:schemeClr>
+          </a:lnRef>
+          <a:fillRef idx="1">
+            <a:schemeClr val="accent1"/>
+          </a:fillRef>
+          <a:effectRef idx="0">
+            <a:schemeClr val="accent1"/>
+          </a:effectRef>
+          <a:fontRef idx="minor">
+            <a:schemeClr val="lt1"/>
+          </a:fontRef>
+        </p:style>
+        <p:txBody>
+          <a:bodyPr rtlCol="0" anchor="ctr"/>
+          <a:lstStyle/>
+          <a:p>
+            <a:pPr algn="ctr"/>
+            <a:endParaRPr lang="en-US"/>
+          </a:p>
+        </p:txBody>
+      </p:sp>
+      <p:sp>
+        <p:nvSpPr>
+          <p:cNvPr id="21" name="Oval 20"/>
+          <p:cNvSpPr/>
+          <p:nvPr/>
+        </p:nvSpPr>
+        <p:spPr>
+          <a:xfrm>
+            <a:off x="2297561" y="3902555"/>
+            <a:ext cx="90666" cy="86798"/>
+          </a:xfrm>
+          <a:prstGeom prst="ellipse">
+            <a:avLst/>
+          </a:prstGeom>
+          <a:solidFill>
+            <a:srgbClr val="4D4D4D"/>
+          </a:solidFill>
+          <a:ln>
+            <a:solidFill>
+              <a:srgbClr val="4D4D4D"/>
+            </a:solidFill>
+          </a:ln>
+        </p:spPr>
+        <p:style>
+          <a:lnRef idx="2">
+            <a:schemeClr val="accent1">
+              <a:shade val="50000"/>
+            </a:schemeClr>
+          </a:lnRef>
+          <a:fillRef idx="1">
+            <a:schemeClr val="accent1"/>
+          </a:fillRef>
+          <a:effectRef idx="0">
+            <a:schemeClr val="accent1"/>
+          </a:effectRef>
+          <a:fontRef idx="minor">
+            <a:schemeClr val="lt1"/>
+          </a:fontRef>
+        </p:style>
+        <p:txBody>
+          <a:bodyPr rtlCol="0" anchor="ctr"/>
+          <a:lstStyle/>
+          <a:p>
+            <a:pPr algn="ctr"/>
+            <a:endParaRPr lang="en-US"/>
+          </a:p>
+        </p:txBody>
+      </p:sp>
+      <p:sp>
+        <p:nvSpPr>
+          <p:cNvPr id="23" name="Rectangle 22"/>
+          <p:cNvSpPr/>
+          <p:nvPr/>
+        </p:nvSpPr>
+        <p:spPr>
+          <a:xfrm>
+            <a:off x="1533337" y="3648639"/>
+            <a:ext cx="1874625" cy="253916"/>
+          </a:xfrm>
+          <a:prstGeom prst="rect">
+            <a:avLst/>
+          </a:prstGeom>
+        </p:spPr>
+        <p:txBody>
+          <a:bodyPr wrap="square">
+            <a:spAutoFit/>
+          </a:bodyPr>
+          <a:lstStyle/>
+          <a:p>
+            <a:r>
+              <a:rPr lang="en-US" sz="1050" dirty="0" smtClean="0">
+                <a:latin typeface="Titillium Web" pitchFamily="2" charset="0"/>
+              </a:rPr>
+              <a:t>Loading and tidying data.</a:t>
+            </a:r>
+            <a:endParaRPr lang="en-US" sz="1050" dirty="0">
+              <a:latin typeface="Titillium Web" pitchFamily="2" charset="0"/>
+            </a:endParaRPr>
+          </a:p>
+        </p:txBody>
+      </p:sp>
     </p:spTree>
     <p:extLst>
       <p:ext uri="{BB962C8B-B14F-4D97-AF65-F5344CB8AC3E}">
@@ -5398,7 +6088,7 @@
   <a:extraClrSchemeLst/>
   <a:extLst>
     <a:ext uri="{05A4C25C-085E-4340-85A3-A5531E510DB2}">
-      <thm15:themeFamily xmlns:thm15="http://schemas.microsoft.com/office/thememl/2012/main" xmlns="" name="Office Theme" id="{62F939B6-93AF-4DB8-9C6B-D6C7DFDC589F}" vid="{4A3C46E8-61CC-4603-A589-7422A47A8E4A}"/>
+      <thm15:themeFamily xmlns="" xmlns:thm15="http://schemas.microsoft.com/office/thememl/2012/main" name="Office Theme" id="{62F939B6-93AF-4DB8-9C6B-D6C7DFDC589F}" vid="{4A3C46E8-61CC-4603-A589-7422A47A8E4A}"/>
     </a:ext>
   </a:extLst>
 </a:theme>

</xml_diff>